<commit_message>
updated discussion and slides
</commit_message>
<xml_diff>
--- a/SDSS4-Slides-Part2.pptx
+++ b/SDSS4-Slides-Part2.pptx
@@ -5,7 +5,7 @@
     <p:sldMasterId id="2147483648" r:id="rId1"/>
   </p:sldMasterIdLst>
   <p:notesMasterIdLst>
-    <p:notesMasterId r:id="rId18"/>
+    <p:notesMasterId r:id="rId19"/>
   </p:notesMasterIdLst>
   <p:sldIdLst>
     <p:sldId id="428" r:id="rId2"/>
@@ -21,9 +21,10 @@
     <p:sldId id="420" r:id="rId12"/>
     <p:sldId id="422" r:id="rId13"/>
     <p:sldId id="429" r:id="rId14"/>
-    <p:sldId id="430" r:id="rId15"/>
-    <p:sldId id="425" r:id="rId16"/>
-    <p:sldId id="431" r:id="rId17"/>
+    <p:sldId id="432" r:id="rId15"/>
+    <p:sldId id="430" r:id="rId16"/>
+    <p:sldId id="425" r:id="rId17"/>
+    <p:sldId id="431" r:id="rId18"/>
   </p:sldIdLst>
   <p:sldSz cx="12192000" cy="6858000"/>
   <p:notesSz cx="6858000" cy="9144000"/>
@@ -3817,14 +3818,14 @@
               <a:defRPr/>
             </a:pPr>
             <a:r>
-              <a:rPr lang="en-US" sz="3600" dirty="0">
+              <a:rPr lang="en-US" sz="3600" dirty="0" smtClean="0">
                 <a:solidFill>
                   <a:prstClr val="black"/>
                 </a:solidFill>
                 <a:latin typeface="+mj-lt"/>
                 <a:cs typeface="Arial" panose="020B0604020202020204" pitchFamily="34" charset="0"/>
               </a:rPr>
-              <a:t>Open Discussion</a:t>
+              <a:t>Questions about Infrastructure?</a:t>
             </a:r>
             <a:endParaRPr kumimoji="0" lang="en-US" sz="3600" b="0" i="0" u="none" strike="noStrike" kern="1200" cap="none" spc="0" normalizeH="0" baseline="0" noProof="0" dirty="0">
               <a:ln>
@@ -4002,7 +4003,7 @@
     </p:spTree>
     <p:extLst>
       <p:ext uri="{BB962C8B-B14F-4D97-AF65-F5344CB8AC3E}">
-        <p14:creationId xmlns:p14="http://schemas.microsoft.com/office/powerpoint/2010/main" val="3456700371"/>
+        <p14:creationId xmlns:p14="http://schemas.microsoft.com/office/powerpoint/2010/main" val="133729935"/>
       </p:ext>
     </p:extLst>
   </p:cSld>
@@ -4031,6 +4032,264 @@
       </p:grpSpPr>
       <p:sp>
         <p:nvSpPr>
+          <p:cNvPr id="4" name="TextBox 3">
+            <a:extLst>
+              <a:ext uri="{FF2B5EF4-FFF2-40B4-BE49-F238E27FC236}">
+                <a16:creationId xmlns:a16="http://schemas.microsoft.com/office/drawing/2014/main" id="{31F0EB35-C517-BF04-0A99-DAF9932647A3}"/>
+              </a:ext>
+            </a:extLst>
+          </p:cNvPr>
+          <p:cNvSpPr txBox="1"/>
+          <p:nvPr/>
+        </p:nvSpPr>
+        <p:spPr>
+          <a:xfrm>
+            <a:off x="637308" y="3880326"/>
+            <a:ext cx="10300668" cy="646331"/>
+          </a:xfrm>
+          <a:prstGeom prst="rect">
+            <a:avLst/>
+          </a:prstGeom>
+          <a:noFill/>
+        </p:spPr>
+        <p:txBody>
+          <a:bodyPr wrap="square" rtlCol="0">
+            <a:spAutoFit/>
+          </a:bodyPr>
+          <a:lstStyle/>
+          <a:p>
+            <a:pPr marL="0" marR="0" lvl="0" indent="0" algn="l" defTabSz="914400" rtl="0" eaLnBrk="1" fontAlgn="auto" latinLnBrk="0" hangingPunct="1">
+              <a:lnSpc>
+                <a:spcPct val="100000"/>
+              </a:lnSpc>
+              <a:spcBef>
+                <a:spcPts val="0"/>
+              </a:spcBef>
+              <a:spcAft>
+                <a:spcPts val="0"/>
+              </a:spcAft>
+              <a:buClrTx/>
+              <a:buSzTx/>
+              <a:buFontTx/>
+              <a:buNone/>
+              <a:tabLst/>
+              <a:defRPr/>
+            </a:pPr>
+            <a:r>
+              <a:rPr lang="en-US" sz="3600" dirty="0">
+                <a:solidFill>
+                  <a:prstClr val="black"/>
+                </a:solidFill>
+                <a:latin typeface="+mj-lt"/>
+                <a:cs typeface="Arial" panose="020B0604020202020204" pitchFamily="34" charset="0"/>
+              </a:rPr>
+              <a:t>Open Discussion</a:t>
+            </a:r>
+            <a:endParaRPr kumimoji="0" lang="en-US" sz="3600" b="0" i="0" u="none" strike="noStrike" kern="1200" cap="none" spc="0" normalizeH="0" baseline="0" noProof="0" dirty="0">
+              <a:ln>
+                <a:noFill/>
+              </a:ln>
+              <a:solidFill>
+                <a:prstClr val="black"/>
+              </a:solidFill>
+              <a:effectLst/>
+              <a:uLnTx/>
+              <a:uFillTx/>
+              <a:latin typeface="+mj-lt"/>
+              <a:ea typeface="+mn-ea"/>
+              <a:cs typeface="Arial" panose="020B0604020202020204" pitchFamily="34" charset="0"/>
+            </a:endParaRPr>
+          </a:p>
+        </p:txBody>
+      </p:sp>
+      <p:sp>
+        <p:nvSpPr>
+          <p:cNvPr id="5" name="TextBox 4">
+            <a:extLst>
+              <a:ext uri="{FF2B5EF4-FFF2-40B4-BE49-F238E27FC236}">
+                <a16:creationId xmlns:a16="http://schemas.microsoft.com/office/drawing/2014/main" id="{F92911CC-0ABB-5FDC-5478-40F753B0BB2B}"/>
+              </a:ext>
+            </a:extLst>
+          </p:cNvPr>
+          <p:cNvSpPr txBox="1"/>
+          <p:nvPr/>
+        </p:nvSpPr>
+        <p:spPr>
+          <a:xfrm>
+            <a:off x="637308" y="4549519"/>
+            <a:ext cx="10181968" cy="400110"/>
+          </a:xfrm>
+          <a:prstGeom prst="rect">
+            <a:avLst/>
+          </a:prstGeom>
+          <a:noFill/>
+        </p:spPr>
+        <p:txBody>
+          <a:bodyPr wrap="square" rtlCol="0">
+            <a:spAutoFit/>
+          </a:bodyPr>
+          <a:lstStyle/>
+          <a:p>
+            <a:pPr marL="0" marR="0" lvl="0" indent="0" algn="l" defTabSz="914400" rtl="0" eaLnBrk="1" fontAlgn="auto" latinLnBrk="0" hangingPunct="1">
+              <a:lnSpc>
+                <a:spcPct val="100000"/>
+              </a:lnSpc>
+              <a:spcBef>
+                <a:spcPts val="0"/>
+              </a:spcBef>
+              <a:spcAft>
+                <a:spcPts val="0"/>
+              </a:spcAft>
+              <a:buClrTx/>
+              <a:buSzTx/>
+              <a:buFontTx/>
+              <a:buNone/>
+              <a:tabLst/>
+              <a:defRPr/>
+            </a:pPr>
+            <a:r>
+              <a:rPr kumimoji="0" lang="en-US" sz="2000" b="0" i="0" u="none" strike="noStrike" kern="1200" cap="none" spc="0" normalizeH="0" baseline="0" noProof="0" dirty="0">
+                <a:ln>
+                  <a:noFill/>
+                </a:ln>
+                <a:solidFill>
+                  <a:prstClr val="black"/>
+                </a:solidFill>
+                <a:effectLst/>
+                <a:uLnTx/>
+                <a:uFillTx/>
+                <a:ea typeface="+mn-ea"/>
+                <a:cs typeface="Arial" panose="020B0604020202020204" pitchFamily="34" charset="0"/>
+              </a:rPr>
+              <a:t>We invite questions, feedback, and discussion about R&amp;R in spatial data science</a:t>
+            </a:r>
+          </a:p>
+        </p:txBody>
+      </p:sp>
+      <p:cxnSp>
+        <p:nvCxnSpPr>
+          <p:cNvPr id="7" name="Straight Connector 6">
+            <a:extLst>
+              <a:ext uri="{FF2B5EF4-FFF2-40B4-BE49-F238E27FC236}">
+                <a16:creationId xmlns:a16="http://schemas.microsoft.com/office/drawing/2014/main" id="{E6F5E451-1100-A1C7-9492-01286A8D690C}"/>
+              </a:ext>
+            </a:extLst>
+          </p:cNvPr>
+          <p:cNvCxnSpPr>
+            <a:cxnSpLocks/>
+          </p:cNvCxnSpPr>
+          <p:nvPr/>
+        </p:nvCxnSpPr>
+        <p:spPr>
+          <a:xfrm>
+            <a:off x="518555" y="3964160"/>
+            <a:ext cx="0" cy="961719"/>
+          </a:xfrm>
+          <a:prstGeom prst="line">
+            <a:avLst/>
+          </a:prstGeom>
+          <a:ln w="76200">
+            <a:solidFill>
+              <a:srgbClr val="00306C"/>
+            </a:solidFill>
+          </a:ln>
+        </p:spPr>
+        <p:style>
+          <a:lnRef idx="1">
+            <a:schemeClr val="accent1"/>
+          </a:lnRef>
+          <a:fillRef idx="0">
+            <a:schemeClr val="accent1"/>
+          </a:fillRef>
+          <a:effectRef idx="0">
+            <a:schemeClr val="accent1"/>
+          </a:effectRef>
+          <a:fontRef idx="minor">
+            <a:schemeClr val="tx1"/>
+          </a:fontRef>
+        </p:style>
+      </p:cxnSp>
+      <p:sp>
+        <p:nvSpPr>
+          <p:cNvPr id="9" name="Rectangle 8">
+            <a:extLst>
+              <a:ext uri="{FF2B5EF4-FFF2-40B4-BE49-F238E27FC236}">
+                <a16:creationId xmlns:a16="http://schemas.microsoft.com/office/drawing/2014/main" id="{6D0C4CF5-B6CF-3BB9-2723-C32B2900C3AE}"/>
+              </a:ext>
+            </a:extLst>
+          </p:cNvPr>
+          <p:cNvSpPr/>
+          <p:nvPr/>
+        </p:nvSpPr>
+        <p:spPr>
+          <a:xfrm>
+            <a:off x="142504" y="165276"/>
+            <a:ext cx="376045" cy="1046007"/>
+          </a:xfrm>
+          <a:prstGeom prst="rect">
+            <a:avLst/>
+          </a:prstGeom>
+          <a:ln>
+            <a:solidFill>
+              <a:schemeClr val="bg1"/>
+            </a:solidFill>
+          </a:ln>
+        </p:spPr>
+        <p:style>
+          <a:lnRef idx="2">
+            <a:schemeClr val="accent6"/>
+          </a:lnRef>
+          <a:fillRef idx="1">
+            <a:schemeClr val="lt1"/>
+          </a:fillRef>
+          <a:effectRef idx="0">
+            <a:schemeClr val="accent6"/>
+          </a:effectRef>
+          <a:fontRef idx="minor">
+            <a:schemeClr val="dk1"/>
+          </a:fontRef>
+        </p:style>
+        <p:txBody>
+          <a:bodyPr rtlCol="0" anchor="ctr"/>
+          <a:lstStyle/>
+          <a:p>
+            <a:pPr algn="ctr"/>
+            <a:endParaRPr lang="en-US"/>
+          </a:p>
+        </p:txBody>
+      </p:sp>
+    </p:spTree>
+    <p:extLst>
+      <p:ext uri="{BB962C8B-B14F-4D97-AF65-F5344CB8AC3E}">
+        <p14:creationId xmlns:p14="http://schemas.microsoft.com/office/powerpoint/2010/main" val="3456700371"/>
+      </p:ext>
+    </p:extLst>
+  </p:cSld>
+  <p:clrMapOvr>
+    <a:masterClrMapping/>
+  </p:clrMapOvr>
+</p:sld>
+</file>
+
+<file path=ppt/slides/slide16.xml><?xml version="1.0" encoding="utf-8"?>
+<p:sld xmlns:a="http://schemas.openxmlformats.org/drawingml/2006/main" xmlns:r="http://schemas.openxmlformats.org/officeDocument/2006/relationships" xmlns:p="http://schemas.openxmlformats.org/presentationml/2006/main">
+  <p:cSld>
+    <p:spTree>
+      <p:nvGrpSpPr>
+        <p:cNvPr id="1" name=""/>
+        <p:cNvGrpSpPr/>
+        <p:nvPr/>
+      </p:nvGrpSpPr>
+      <p:grpSpPr>
+        <a:xfrm>
+          <a:off x="0" y="0"/>
+          <a:ext cx="0" cy="0"/>
+          <a:chOff x="0" y="0"/>
+          <a:chExt cx="0" cy="0"/>
+        </a:xfrm>
+      </p:grpSpPr>
+      <p:sp>
+        <p:nvSpPr>
           <p:cNvPr id="2" name="Text Placeholder 1">
             <a:extLst>
               <a:ext uri="{FF2B5EF4-FFF2-40B4-BE49-F238E27FC236}">
@@ -4115,16 +4374,53 @@
             </a:pPr>
             <a:r>
               <a:rPr lang="en-US" dirty="0"/>
-              <a:t>What </a:t>
+              <a:t>Can you share any </a:t>
             </a:r>
             <a:r>
               <a:rPr lang="en-US" b="1" i="1" dirty="0"/>
-              <a:t>barriers</a:t>
+              <a:t>successes</a:t>
             </a:r>
             <a:r>
               <a:rPr lang="en-US" dirty="0"/>
-              <a:t> do you perceive to adopting open and reproducible research practices in your own scholarship (research and teaching)?</a:t>
-            </a:r>
+              <a:t>, </a:t>
+            </a:r>
+            <a:r>
+              <a:rPr lang="en-US" b="1" i="1" dirty="0"/>
+              <a:t>advice</a:t>
+            </a:r>
+            <a:r>
+              <a:rPr lang="en-US" dirty="0"/>
+              <a:t>, or </a:t>
+            </a:r>
+            <a:r>
+              <a:rPr lang="en-US" b="1" i="1" dirty="0"/>
+              <a:t>best practices </a:t>
+            </a:r>
+            <a:r>
+              <a:rPr lang="en-US" dirty="0"/>
+              <a:t>introducing reproducibility and replicability in your spatial data science </a:t>
+            </a:r>
+            <a:r>
+              <a:rPr lang="en-US" dirty="0" smtClean="0"/>
+              <a:t>scholarship </a:t>
+            </a:r>
+            <a:r>
+              <a:rPr lang="en-US" dirty="0"/>
+              <a:t>(research </a:t>
+            </a:r>
+            <a:r>
+              <a:rPr lang="en-US" dirty="0" smtClean="0"/>
+              <a:t>or </a:t>
+            </a:r>
+            <a:r>
+              <a:rPr lang="en-US" dirty="0"/>
+              <a:t>teaching)</a:t>
+            </a:r>
+            <a:r>
+              <a:rPr lang="en-US" dirty="0" smtClean="0"/>
+              <a:t>?</a:t>
+            </a:r>
+            <a:endParaRPr lang="en-US" dirty="0"/>
           </a:p>
           <a:p>
             <a:pPr marL="457200" indent="-457200">
@@ -4135,9 +4431,22 @@
               <a:buAutoNum type="arabicPeriod"/>
             </a:pPr>
             <a:r>
+              <a:rPr lang="en-US" dirty="0" smtClean="0"/>
+              <a:t>What </a:t>
+            </a:r>
+            <a:r>
+              <a:rPr lang="en-US" b="1" i="1" dirty="0"/>
+              <a:t>barriers</a:t>
+            </a:r>
+            <a:r>
               <a:rPr lang="en-US" dirty="0"/>
-              <a:t>Could any resources or changes help overcome those barriers?</a:t>
-            </a:r>
+              <a:t> do you perceive to adopting open and reproducible research practices in your own </a:t>
+            </a:r>
+            <a:r>
+              <a:rPr lang="en-US" dirty="0" smtClean="0"/>
+              <a:t>scholarship?</a:t>
+            </a:r>
+            <a:endParaRPr lang="en-US" dirty="0"/>
           </a:p>
           <a:p>
             <a:pPr marL="457200" indent="-457200">
@@ -4149,21 +4458,41 @@
             </a:pPr>
             <a:r>
               <a:rPr lang="en-US" dirty="0"/>
-              <a:t>How can we further improve infrastructure for reproducible and replicable scholarship in spatial data science?</a:t>
-            </a:r>
-          </a:p>
-          <a:p>
-            <a:pPr marL="457200" indent="-457200">
-              <a:spcAft>
-                <a:spcPts val="2400"/>
-              </a:spcAft>
-              <a:buFont typeface="+mj-lt"/>
-              <a:buAutoNum type="arabicPeriod"/>
-            </a:pPr>
+              <a:t>Could any </a:t>
+            </a:r>
+            <a:r>
+              <a:rPr lang="en-US" b="1" i="1" dirty="0" smtClean="0"/>
+              <a:t>resources,</a:t>
+            </a:r>
+            <a:r>
+              <a:rPr lang="en-US" dirty="0" smtClean="0"/>
+              <a:t> </a:t>
+            </a:r>
+            <a:r>
+              <a:rPr lang="en-US" b="1" i="1" dirty="0" smtClean="0"/>
+              <a:t>changes,</a:t>
+            </a:r>
+            <a:r>
+              <a:rPr lang="en-US" dirty="0" smtClean="0"/>
+              <a:t> or </a:t>
+            </a:r>
+            <a:r>
+              <a:rPr lang="en-US" b="1" i="1" dirty="0" smtClean="0"/>
+              <a:t>incentives</a:t>
+            </a:r>
+            <a:r>
+              <a:rPr lang="en-US" dirty="0" smtClean="0"/>
+              <a:t> help </a:t>
+            </a:r>
             <a:r>
               <a:rPr lang="en-US" dirty="0"/>
-              <a:t>Can you share any successes, advice, or best practices introducing reproducibility and replicability in your spatial data science scholarship?</a:t>
-            </a:r>
+              <a:t>overcome those barriers</a:t>
+            </a:r>
+            <a:r>
+              <a:rPr lang="en-US" dirty="0" smtClean="0"/>
+              <a:t>?</a:t>
+            </a:r>
+            <a:endParaRPr lang="en-US" dirty="0"/>
           </a:p>
         </p:txBody>
       </p:sp>
@@ -4187,7 +4516,7 @@
 </p:sld>
 </file>
 
-<file path=ppt/slides/slide16.xml><?xml version="1.0" encoding="utf-8"?>
+<file path=ppt/slides/slide17.xml><?xml version="1.0" encoding="utf-8"?>
 <p:sld xmlns:a="http://schemas.openxmlformats.org/drawingml/2006/main" xmlns:r="http://schemas.openxmlformats.org/officeDocument/2006/relationships" xmlns:p="http://schemas.openxmlformats.org/presentationml/2006/main">
   <p:cSld>
     <p:spTree>

</xml_diff>